<commit_message>
[update] se corrige presentación principal LogBook
</commit_message>
<xml_diff>
--- a/1- Análisis/1- Presentación/Proyecto LogBook.pptx
+++ b/1- Análisis/1- Presentación/Proyecto LogBook.pptx
@@ -247,7 +247,41 @@
       </a:defRPr>
     </a:lvl9pPr>
   </p:defaultTextStyle>
+  <p:extLst>
+    <p:ext uri="{EFAFB233-063F-42B5-8137-9DF3F51BA10A}">
+      <p15:sldGuideLst xmlns:p15="http://schemas.microsoft.com/office/powerpoint/2012/main"/>
+    </p:ext>
+  </p:extLst>
 </p:presentation>
+</file>
+
+<file path=ppt/changesInfos/changesInfo1.xml><?xml version="1.0" encoding="utf-8"?>
+<pc:chgInfo xmlns:a="http://schemas.openxmlformats.org/drawingml/2006/main" xmlns:r="http://schemas.openxmlformats.org/officeDocument/2006/relationships" xmlns:ac="http://schemas.microsoft.com/office/drawing/2013/main/command" xmlns:pc="http://schemas.microsoft.com/office/powerpoint/2013/main/command">
+  <pc:docChgLst>
+    <pc:chgData name="Daniel Camilo Páez" userId="5229ac11463fc4c2" providerId="LiveId" clId="{DB91D1EE-DB2A-45F9-A966-46B2F1A11822}"/>
+    <pc:docChg chg="modSld">
+      <pc:chgData name="Daniel Camilo Páez" userId="5229ac11463fc4c2" providerId="LiveId" clId="{DB91D1EE-DB2A-45F9-A966-46B2F1A11822}" dt="2020-05-15T23:32:37.646" v="21" actId="20577"/>
+      <pc:docMkLst>
+        <pc:docMk/>
+      </pc:docMkLst>
+      <pc:sldChg chg="modSp mod">
+        <pc:chgData name="Daniel Camilo Páez" userId="5229ac11463fc4c2" providerId="LiveId" clId="{DB91D1EE-DB2A-45F9-A966-46B2F1A11822}" dt="2020-05-15T23:32:37.646" v="21" actId="20577"/>
+        <pc:sldMkLst>
+          <pc:docMk/>
+          <pc:sldMk cId="0" sldId="262"/>
+        </pc:sldMkLst>
+        <pc:spChg chg="mod">
+          <ac:chgData name="Daniel Camilo Páez" userId="5229ac11463fc4c2" providerId="LiveId" clId="{DB91D1EE-DB2A-45F9-A966-46B2F1A11822}" dt="2020-05-15T23:32:37.646" v="21" actId="20577"/>
+          <ac:spMkLst>
+            <pc:docMk/>
+            <pc:sldMk cId="0" sldId="262"/>
+            <ac:spMk id="89" creationId="{00000000-0000-0000-0000-000000000000}"/>
+          </ac:spMkLst>
+        </pc:spChg>
+      </pc:sldChg>
+    </pc:docChg>
+  </pc:docChgLst>
+</pc:chgInfo>
 </file>
 
 <file path=ppt/notesMasters/notesMaster1.xml><?xml version="1.0" encoding="utf-8"?>
@@ -6002,7 +6036,7 @@
               <a:buFont typeface="Arial"/>
               <a:buNone/>
             </a:pPr>
-            <a:endParaRPr sz="1200" b="0" i="0" u="none" strike="noStrike" cap="none">
+            <a:endParaRPr sz="1200" b="0" i="0" u="none" strike="noStrike" cap="none" dirty="0">
               <a:solidFill>
                 <a:srgbClr val="002060"/>
               </a:solidFill>
@@ -6030,7 +6064,7 @@
               <a:buFont typeface="Arial"/>
               <a:buNone/>
             </a:pPr>
-            <a:endParaRPr sz="1200" b="0" i="0" u="none" strike="noStrike" cap="none">
+            <a:endParaRPr sz="1200" b="0" i="0" u="none" strike="noStrike" cap="none" dirty="0">
               <a:solidFill>
                 <a:srgbClr val="002060"/>
               </a:solidFill>
@@ -6054,6 +6088,38 @@
               <a:buNone/>
             </a:pPr>
             <a:r>
+              <a:rPr lang="es-ES" sz="1200" b="0" i="0" u="none" strike="noStrike" cap="none" dirty="0">
+                <a:solidFill>
+                  <a:schemeClr val="dk1"/>
+                </a:solidFill>
+                <a:latin typeface="Arial"/>
+                <a:ea typeface="Arial"/>
+                <a:cs typeface="Arial"/>
+                <a:sym typeface="Arial"/>
+              </a:rPr>
+              <a:t>Evidenciando la forma en que se le da manejo a la </a:t>
+            </a:r>
+            <a:r>
+              <a:rPr lang="es-ES" sz="1200" dirty="0">
+                <a:solidFill>
+                  <a:schemeClr val="dk1"/>
+                </a:solidFill>
+              </a:rPr>
+              <a:t>gestión</a:t>
+            </a:r>
+            <a:r>
+              <a:rPr lang="es-ES" sz="1200" b="0" i="0" u="none" strike="noStrike" cap="none" dirty="0">
+                <a:solidFill>
+                  <a:schemeClr val="dk1"/>
+                </a:solidFill>
+                <a:latin typeface="Arial"/>
+                <a:ea typeface="Arial"/>
+                <a:cs typeface="Arial"/>
+                <a:sym typeface="Arial"/>
+              </a:rPr>
+              <a:t> de los usuarios del CEET de la sede Colombia, se contribuye creando un módulo web para instructores del sistema de información de horarios, que gestiona sus </a:t>
+            </a:r>
+            <a:r>
               <a:rPr lang="es-ES" sz="1200" b="0" i="0" u="none" strike="noStrike" cap="none">
                 <a:solidFill>
                   <a:schemeClr val="dk1"/>
@@ -6063,9 +6129,41 @@
                 <a:cs typeface="Arial"/>
                 <a:sym typeface="Arial"/>
               </a:rPr>
-              <a:t>Evidenciando la forma en que se le da manejo a la información de los usuarios del CEET de la sede Colombia, se contribuye creando un módulo web para instructores del sistema de información de horarios, que gestiona sus datos y/o información de una forma óptima, añadiendo una interfaz gráfica intuitiva y fácil de utilizar.</a:t>
+              <a:t>datos </a:t>
             </a:r>
-            <a:endParaRPr/>
+            <a:r>
+              <a:rPr lang="es-ES" sz="1200">
+                <a:solidFill>
+                  <a:schemeClr val="dk1"/>
+                </a:solidFill>
+              </a:rPr>
+              <a:t>e</a:t>
+            </a:r>
+            <a:r>
+              <a:rPr lang="es-ES" sz="1200" b="0" i="0" u="none" strike="noStrike" cap="none">
+                <a:solidFill>
+                  <a:schemeClr val="dk1"/>
+                </a:solidFill>
+                <a:latin typeface="Arial"/>
+                <a:ea typeface="Arial"/>
+                <a:cs typeface="Arial"/>
+                <a:sym typeface="Arial"/>
+              </a:rPr>
+              <a:t> </a:t>
+            </a:r>
+            <a:r>
+              <a:rPr lang="es-ES" sz="1200" b="0" i="0" u="none" strike="noStrike" cap="none" dirty="0">
+                <a:solidFill>
+                  <a:schemeClr val="dk1"/>
+                </a:solidFill>
+                <a:latin typeface="Arial"/>
+                <a:ea typeface="Arial"/>
+                <a:cs typeface="Arial"/>
+                <a:sym typeface="Arial"/>
+              </a:rPr>
+              <a:t>información de una forma óptima, añadiendo una interfaz gráfica intuitiva y fácil de utilizar.</a:t>
+            </a:r>
+            <a:endParaRPr dirty="0"/>
           </a:p>
           <a:p>
             <a:pPr marL="285750" marR="0" lvl="0" indent="-209550" algn="just" rtl="0">
@@ -6085,7 +6183,7 @@
               <a:buFont typeface="Arial"/>
               <a:buNone/>
             </a:pPr>
-            <a:endParaRPr sz="1200" b="0" i="0" u="none" strike="noStrike" cap="none">
+            <a:endParaRPr sz="1200" b="0" i="0" u="none" strike="noStrike" cap="none" dirty="0">
               <a:solidFill>
                 <a:srgbClr val="002060"/>
               </a:solidFill>
@@ -6113,7 +6211,7 @@
               <a:buFont typeface="Arial"/>
               <a:buNone/>
             </a:pPr>
-            <a:endParaRPr sz="1400" b="0" i="0" u="none" strike="noStrike" cap="none">
+            <a:endParaRPr sz="1400" b="0" i="0" u="none" strike="noStrike" cap="none" dirty="0">
               <a:solidFill>
                 <a:srgbClr val="002060"/>
               </a:solidFill>

</xml_diff>